<commit_message>
coreection de petit bug
</commit_message>
<xml_diff>
--- a/PrésentationProjet 3.pptx
+++ b/PrésentationProjet 3.pptx
@@ -334,7 +334,7 @@
             <a:fld id="{B61BEF0D-F0BB-DE4B-95CE-6DB70DBA9567}" type="datetimeFigureOut">
               <a:rPr lang="en-US" dirty="0"/>
               <a:pPr/>
-              <a:t>11/28/21</a:t>
+              <a:t>12/4/21</a:t>
             </a:fld>
             <a:endParaRPr lang="en-US" dirty="0"/>
           </a:p>
@@ -622,7 +622,7 @@
             <a:fld id="{B61BEF0D-F0BB-DE4B-95CE-6DB70DBA9567}" type="datetimeFigureOut">
               <a:rPr lang="en-US" dirty="0"/>
               <a:pPr/>
-              <a:t>11/28/21</a:t>
+              <a:t>12/4/21</a:t>
             </a:fld>
             <a:endParaRPr lang="en-US" dirty="0"/>
           </a:p>
@@ -878,7 +878,7 @@
             <a:fld id="{B61BEF0D-F0BB-DE4B-95CE-6DB70DBA9567}" type="datetimeFigureOut">
               <a:rPr lang="en-US" dirty="0"/>
               <a:pPr/>
-              <a:t>11/28/21</a:t>
+              <a:t>12/4/21</a:t>
             </a:fld>
             <a:endParaRPr lang="en-US" dirty="0"/>
           </a:p>
@@ -1344,7 +1344,7 @@
             <a:fld id="{B61BEF0D-F0BB-DE4B-95CE-6DB70DBA9567}" type="datetimeFigureOut">
               <a:rPr lang="en-US" dirty="0"/>
               <a:pPr/>
-              <a:t>11/28/21</a:t>
+              <a:t>12/4/21</a:t>
             </a:fld>
             <a:endParaRPr lang="en-US" dirty="0"/>
           </a:p>
@@ -1521,7 +1521,7 @@
             <a:fld id="{B61BEF0D-F0BB-DE4B-95CE-6DB70DBA9567}" type="datetimeFigureOut">
               <a:rPr lang="en-US" dirty="0"/>
               <a:pPr/>
-              <a:t>11/28/21</a:t>
+              <a:t>12/4/21</a:t>
             </a:fld>
             <a:endParaRPr lang="en-US" dirty="0"/>
           </a:p>
@@ -2094,7 +2094,7 @@
             <a:fld id="{B61BEF0D-F0BB-DE4B-95CE-6DB70DBA9567}" type="datetimeFigureOut">
               <a:rPr lang="en-US" dirty="0"/>
               <a:pPr/>
-              <a:t>11/28/21</a:t>
+              <a:t>12/4/21</a:t>
             </a:fld>
             <a:endParaRPr lang="en-US" dirty="0"/>
           </a:p>
@@ -2423,7 +2423,7 @@
             <a:fld id="{B61BEF0D-F0BB-DE4B-95CE-6DB70DBA9567}" type="datetimeFigureOut">
               <a:rPr lang="en-US" dirty="0"/>
               <a:pPr/>
-              <a:t>11/28/21</a:t>
+              <a:t>12/4/21</a:t>
             </a:fld>
             <a:endParaRPr lang="en-US" dirty="0"/>
           </a:p>
@@ -2595,7 +2595,7 @@
             <a:fld id="{B61BEF0D-F0BB-DE4B-95CE-6DB70DBA9567}" type="datetimeFigureOut">
               <a:rPr lang="en-US" dirty="0"/>
               <a:pPr/>
-              <a:t>11/28/21</a:t>
+              <a:t>12/4/21</a:t>
             </a:fld>
             <a:endParaRPr lang="en-US" dirty="0"/>
           </a:p>
@@ -2772,7 +2772,7 @@
             <a:fld id="{B61BEF0D-F0BB-DE4B-95CE-6DB70DBA9567}" type="datetimeFigureOut">
               <a:rPr lang="en-US" dirty="0"/>
               <a:pPr/>
-              <a:t>11/28/21</a:t>
+              <a:t>12/4/21</a:t>
             </a:fld>
             <a:endParaRPr lang="en-US" dirty="0"/>
           </a:p>
@@ -2939,7 +2939,7 @@
             <a:fld id="{B61BEF0D-F0BB-DE4B-95CE-6DB70DBA9567}" type="datetimeFigureOut">
               <a:rPr lang="en-US" dirty="0"/>
               <a:pPr/>
-              <a:t>11/28/21</a:t>
+              <a:t>12/4/21</a:t>
             </a:fld>
             <a:endParaRPr lang="en-US" dirty="0"/>
           </a:p>
@@ -3193,7 +3193,7 @@
             <a:fld id="{B61BEF0D-F0BB-DE4B-95CE-6DB70DBA9567}" type="datetimeFigureOut">
               <a:rPr lang="en-US" dirty="0"/>
               <a:pPr/>
-              <a:t>11/28/21</a:t>
+              <a:t>12/4/21</a:t>
             </a:fld>
             <a:endParaRPr lang="en-US" dirty="0"/>
           </a:p>
@@ -3482,7 +3482,7 @@
             <a:fld id="{B61BEF0D-F0BB-DE4B-95CE-6DB70DBA9567}" type="datetimeFigureOut">
               <a:rPr lang="en-US" dirty="0"/>
               <a:pPr/>
-              <a:t>11/28/21</a:t>
+              <a:t>12/4/21</a:t>
             </a:fld>
             <a:endParaRPr lang="en-US" dirty="0"/>
           </a:p>
@@ -3909,7 +3909,7 @@
             <a:fld id="{B61BEF0D-F0BB-DE4B-95CE-6DB70DBA9567}" type="datetimeFigureOut">
               <a:rPr lang="en-US" dirty="0"/>
               <a:pPr/>
-              <a:t>11/28/21</a:t>
+              <a:t>12/4/21</a:t>
             </a:fld>
             <a:endParaRPr lang="en-US" dirty="0"/>
           </a:p>
@@ -4024,7 +4024,7 @@
             <a:fld id="{B61BEF0D-F0BB-DE4B-95CE-6DB70DBA9567}" type="datetimeFigureOut">
               <a:rPr lang="en-US" dirty="0"/>
               <a:pPr/>
-              <a:t>11/28/21</a:t>
+              <a:t>12/4/21</a:t>
             </a:fld>
             <a:endParaRPr lang="en-US" dirty="0"/>
           </a:p>
@@ -4116,7 +4116,7 @@
             <a:fld id="{B61BEF0D-F0BB-DE4B-95CE-6DB70DBA9567}" type="datetimeFigureOut">
               <a:rPr lang="en-US" dirty="0"/>
               <a:pPr/>
-              <a:t>11/28/21</a:t>
+              <a:t>12/4/21</a:t>
             </a:fld>
             <a:endParaRPr lang="en-US" dirty="0"/>
           </a:p>
@@ -4396,7 +4396,7 @@
             <a:fld id="{B61BEF0D-F0BB-DE4B-95CE-6DB70DBA9567}" type="datetimeFigureOut">
               <a:rPr lang="en-US" dirty="0"/>
               <a:pPr/>
-              <a:t>11/28/21</a:t>
+              <a:t>12/4/21</a:t>
             </a:fld>
             <a:endParaRPr lang="en-US" dirty="0"/>
           </a:p>
@@ -4684,7 +4684,7 @@
             <a:fld id="{B61BEF0D-F0BB-DE4B-95CE-6DB70DBA9567}" type="datetimeFigureOut">
               <a:rPr lang="en-US" dirty="0"/>
               <a:pPr/>
-              <a:t>11/28/21</a:t>
+              <a:t>12/4/21</a:t>
             </a:fld>
             <a:endParaRPr lang="en-US" dirty="0"/>
           </a:p>
@@ -4912,7 +4912,7 @@
             <a:fld id="{B61BEF0D-F0BB-DE4B-95CE-6DB70DBA9567}" type="datetimeFigureOut">
               <a:rPr lang="en-US" dirty="0"/>
               <a:pPr/>
-              <a:t>11/28/21</a:t>
+              <a:t>12/4/21</a:t>
             </a:fld>
             <a:endParaRPr lang="en-US" dirty="0"/>
           </a:p>
@@ -5989,7 +5989,7 @@
                 <a:latin typeface="Roboto Black" panose="02000000000000000000" pitchFamily="2" charset="0"/>
                 <a:ea typeface="Roboto Black" panose="02000000000000000000" pitchFamily="2" charset="0"/>
               </a:rPr>
-              <a:t>Vous venez d’être recruté chez </a:t>
+              <a:t>Je viens d’être recruté chez </a:t>
             </a:r>
             <a:r>
               <a:rPr lang="fr-FR" dirty="0" err="1">
@@ -6027,7 +6027,7 @@
                 <a:latin typeface="Roboto Black" panose="02000000000000000000" pitchFamily="2" charset="0"/>
                 <a:ea typeface="Roboto Black" panose="02000000000000000000" pitchFamily="2" charset="0"/>
               </a:rPr>
-              <a:t> </a:t>
+              <a:t>Je travaille sur la </a:t>
             </a:r>
             <a:r>
               <a:rPr lang="fr-FR" dirty="0" err="1">
@@ -6038,7 +6038,7 @@
                 <a:latin typeface="Roboto Black" panose="02000000000000000000" pitchFamily="2" charset="0"/>
                 <a:ea typeface="Roboto Black" panose="02000000000000000000" pitchFamily="2" charset="0"/>
               </a:rPr>
-              <a:t>Ohmyfood</a:t>
+              <a:t>premiere</a:t>
             </a:r>
             <a:r>
               <a:rPr lang="fr-FR" dirty="0">
@@ -6049,10 +6049,65 @@
                 <a:latin typeface="Roboto Black" panose="02000000000000000000" pitchFamily="2" charset="0"/>
                 <a:ea typeface="Roboto Black" panose="02000000000000000000" pitchFamily="2" charset="0"/>
               </a:rPr>
-              <a:t> est une jeune startup qui voudrait s'imposer sur le marché de la restauration. L'objectif est de développer un site 100% mobile qui répertorie les menus de restaurants gastronomiques. En plus des systèmes classiques de réservation, les clients pourront composer le menu de leur repas pour que les plats soient prêts à leur arrivée. Finis, les temps d'attente au restaurant !</a:t>
-            </a:r>
-          </a:p>
-          <a:p>
+              <a:t> version de l’</a:t>
+            </a:r>
+            <a:r>
+              <a:rPr lang="fr-FR" dirty="0" err="1">
+                <a:solidFill>
+                  <a:srgbClr val="BD75FF"/>
+                </a:solidFill>
+                <a:effectLst/>
+                <a:latin typeface="Roboto Black" panose="02000000000000000000" pitchFamily="2" charset="0"/>
+                <a:ea typeface="Roboto Black" panose="02000000000000000000" pitchFamily="2" charset="0"/>
+              </a:rPr>
+              <a:t>integration</a:t>
+            </a:r>
+            <a:r>
+              <a:rPr lang="fr-FR" dirty="0">
+                <a:solidFill>
+                  <a:srgbClr val="BD75FF"/>
+                </a:solidFill>
+                <a:effectLst/>
+                <a:latin typeface="Roboto Black" panose="02000000000000000000" pitchFamily="2" charset="0"/>
+                <a:ea typeface="Roboto Black" panose="02000000000000000000" pitchFamily="2" charset="0"/>
+              </a:rPr>
+              <a:t> de la maquette du site en mobile first suite a </a:t>
+            </a:r>
+            <a:r>
+              <a:rPr lang="fr-FR">
+                <a:solidFill>
+                  <a:srgbClr val="BD75FF"/>
+                </a:solidFill>
+                <a:effectLst/>
+                <a:latin typeface="Roboto Black" panose="02000000000000000000" pitchFamily="2" charset="0"/>
+                <a:ea typeface="Roboto Black" panose="02000000000000000000" pitchFamily="2" charset="0"/>
+              </a:rPr>
+              <a:t>notre briefing.</a:t>
+            </a:r>
+            <a:endParaRPr lang="fr-FR" dirty="0">
+              <a:solidFill>
+                <a:srgbClr val="BD75FF"/>
+              </a:solidFill>
+              <a:effectLst/>
+              <a:latin typeface="Roboto Black" panose="02000000000000000000" pitchFamily="2" charset="0"/>
+              <a:ea typeface="Roboto Black" panose="02000000000000000000" pitchFamily="2" charset="0"/>
+            </a:endParaRPr>
+          </a:p>
+          <a:p>
+            <a:pPr marL="0" indent="0">
+              <a:buNone/>
+            </a:pPr>
+            <a:r>
+              <a:rPr lang="fr-FR" dirty="0">
+                <a:solidFill>
+                  <a:srgbClr val="BD75FF"/>
+                </a:solidFill>
+                <a:effectLst/>
+                <a:latin typeface="Roboto Black" panose="02000000000000000000" pitchFamily="2" charset="0"/>
+                <a:ea typeface="Roboto Black" panose="02000000000000000000" pitchFamily="2" charset="0"/>
+              </a:rPr>
+              <a:t> </a:t>
+            </a:r>
             <a:endParaRPr lang="fr-FR" dirty="0"/>
           </a:p>
         </p:txBody>

</xml_diff>